<commit_message>
Update Figure S3 & Figure 7
</commit_message>
<xml_diff>
--- a/Figures/Figure_3/Figure_3.pptx
+++ b/Figures/Figure_3/Figure_3.pptx
@@ -197,7 +197,7 @@
           <a:p>
             <a:fld id="{ABD72DE5-B6EE-E147-A976-7400C289695F}" type="datetimeFigureOut">
               <a:rPr lang="en-US" smtClean="0"/>
-              <a:t>5/23/23</a:t>
+              <a:t>5/24/23</a:t>
             </a:fld>
             <a:endParaRPr lang="en-US"/>
           </a:p>
@@ -684,7 +684,7 @@
           <a:p>
             <a:fld id="{5829EFD3-DAAF-1A4D-98F0-A61E9156FD54}" type="datetimeFigureOut">
               <a:rPr lang="en-US" smtClean="0"/>
-              <a:t>5/23/23</a:t>
+              <a:t>5/24/23</a:t>
             </a:fld>
             <a:endParaRPr lang="en-US"/>
           </a:p>
@@ -854,7 +854,7 @@
           <a:p>
             <a:fld id="{5829EFD3-DAAF-1A4D-98F0-A61E9156FD54}" type="datetimeFigureOut">
               <a:rPr lang="en-US" smtClean="0"/>
-              <a:t>5/23/23</a:t>
+              <a:t>5/24/23</a:t>
             </a:fld>
             <a:endParaRPr lang="en-US"/>
           </a:p>
@@ -1034,7 +1034,7 @@
           <a:p>
             <a:fld id="{5829EFD3-DAAF-1A4D-98F0-A61E9156FD54}" type="datetimeFigureOut">
               <a:rPr lang="en-US" smtClean="0"/>
-              <a:t>5/23/23</a:t>
+              <a:t>5/24/23</a:t>
             </a:fld>
             <a:endParaRPr lang="en-US"/>
           </a:p>
@@ -1204,7 +1204,7 @@
           <a:p>
             <a:fld id="{5829EFD3-DAAF-1A4D-98F0-A61E9156FD54}" type="datetimeFigureOut">
               <a:rPr lang="en-US" smtClean="0"/>
-              <a:t>5/23/23</a:t>
+              <a:t>5/24/23</a:t>
             </a:fld>
             <a:endParaRPr lang="en-US"/>
           </a:p>
@@ -1448,7 +1448,7 @@
           <a:p>
             <a:fld id="{5829EFD3-DAAF-1A4D-98F0-A61E9156FD54}" type="datetimeFigureOut">
               <a:rPr lang="en-US" smtClean="0"/>
-              <a:t>5/23/23</a:t>
+              <a:t>5/24/23</a:t>
             </a:fld>
             <a:endParaRPr lang="en-US"/>
           </a:p>
@@ -1680,7 +1680,7 @@
           <a:p>
             <a:fld id="{5829EFD3-DAAF-1A4D-98F0-A61E9156FD54}" type="datetimeFigureOut">
               <a:rPr lang="en-US" smtClean="0"/>
-              <a:t>5/23/23</a:t>
+              <a:t>5/24/23</a:t>
             </a:fld>
             <a:endParaRPr lang="en-US"/>
           </a:p>
@@ -2047,7 +2047,7 @@
           <a:p>
             <a:fld id="{5829EFD3-DAAF-1A4D-98F0-A61E9156FD54}" type="datetimeFigureOut">
               <a:rPr lang="en-US" smtClean="0"/>
-              <a:t>5/23/23</a:t>
+              <a:t>5/24/23</a:t>
             </a:fld>
             <a:endParaRPr lang="en-US"/>
           </a:p>
@@ -2165,7 +2165,7 @@
           <a:p>
             <a:fld id="{5829EFD3-DAAF-1A4D-98F0-A61E9156FD54}" type="datetimeFigureOut">
               <a:rPr lang="en-US" smtClean="0"/>
-              <a:t>5/23/23</a:t>
+              <a:t>5/24/23</a:t>
             </a:fld>
             <a:endParaRPr lang="en-US"/>
           </a:p>
@@ -2260,7 +2260,7 @@
           <a:p>
             <a:fld id="{5829EFD3-DAAF-1A4D-98F0-A61E9156FD54}" type="datetimeFigureOut">
               <a:rPr lang="en-US" smtClean="0"/>
-              <a:t>5/23/23</a:t>
+              <a:t>5/24/23</a:t>
             </a:fld>
             <a:endParaRPr lang="en-US"/>
           </a:p>
@@ -2537,7 +2537,7 @@
           <a:p>
             <a:fld id="{5829EFD3-DAAF-1A4D-98F0-A61E9156FD54}" type="datetimeFigureOut">
               <a:rPr lang="en-US" smtClean="0"/>
-              <a:t>5/23/23</a:t>
+              <a:t>5/24/23</a:t>
             </a:fld>
             <a:endParaRPr lang="en-US"/>
           </a:p>
@@ -2794,7 +2794,7 @@
           <a:p>
             <a:fld id="{5829EFD3-DAAF-1A4D-98F0-A61E9156FD54}" type="datetimeFigureOut">
               <a:rPr lang="en-US" smtClean="0"/>
-              <a:t>5/23/23</a:t>
+              <a:t>5/24/23</a:t>
             </a:fld>
             <a:endParaRPr lang="en-US"/>
           </a:p>
@@ -3007,7 +3007,7 @@
           <a:p>
             <a:fld id="{5829EFD3-DAAF-1A4D-98F0-A61E9156FD54}" type="datetimeFigureOut">
               <a:rPr lang="en-US" smtClean="0"/>
-              <a:t>5/23/23</a:t>
+              <a:t>5/24/23</a:t>
             </a:fld>
             <a:endParaRPr lang="en-US"/>
           </a:p>
@@ -3414,10 +3414,10 @@
       </p:grpSpPr>
       <p:pic>
         <p:nvPicPr>
-          <p:cNvPr id="17" name="Picture 16" descr="A picture containing text, diagram, line, plot&#10;&#10;Description automatically generated">
+          <p:cNvPr id="11" name="Picture 10" descr="A picture containing text, diagram, line, plot&#10;&#10;Description automatically generated">
             <a:extLst>
               <a:ext uri="{FF2B5EF4-FFF2-40B4-BE49-F238E27FC236}">
-                <a16:creationId xmlns:a16="http://schemas.microsoft.com/office/drawing/2014/main" id="{05501842-4DB5-97B5-B9DA-B36204666121}"/>
+                <a16:creationId xmlns:a16="http://schemas.microsoft.com/office/drawing/2014/main" id="{1E54C320-0C7F-C7E4-F479-010D0AD5F1C6}"/>
               </a:ext>
             </a:extLst>
           </p:cNvPr>
@@ -3434,7 +3434,7 @@
         </p:blipFill>
         <p:spPr>
           <a:xfrm>
-            <a:off x="2455050" y="12129199"/>
+            <a:off x="2389326" y="12129199"/>
             <a:ext cx="33462598" cy="11754810"/>
           </a:xfrm>
           <a:prstGeom prst="rect">
@@ -3635,10 +3635,10 @@
       </p:sp>
       <p:pic>
         <p:nvPicPr>
-          <p:cNvPr id="20" name="Picture 19" descr="A picture containing diagram, text, line, plot&#10;&#10;Description automatically generated">
+          <p:cNvPr id="12" name="Picture 11" descr="A picture containing diagram, plot, text, line&#10;&#10;Description automatically generated">
             <a:extLst>
               <a:ext uri="{FF2B5EF4-FFF2-40B4-BE49-F238E27FC236}">
-                <a16:creationId xmlns:a16="http://schemas.microsoft.com/office/drawing/2014/main" id="{5306B7D4-C4C8-6C01-C5FB-59B576D9247F}"/>
+                <a16:creationId xmlns:a16="http://schemas.microsoft.com/office/drawing/2014/main" id="{45C63B03-5087-2509-15EC-764E36500041}"/>
               </a:ext>
             </a:extLst>
           </p:cNvPr>
@@ -3649,13 +3649,13 @@
         </p:nvPicPr>
         <p:blipFill rotWithShape="1">
           <a:blip r:embed="rId4"/>
-          <a:srcRect b="3848"/>
+          <a:srcRect b="4303"/>
           <a:stretch/>
         </p:blipFill>
         <p:spPr>
           <a:xfrm>
-            <a:off x="2477863" y="1316148"/>
-            <a:ext cx="33462598" cy="11302572"/>
+            <a:off x="2389326" y="1461165"/>
+            <a:ext cx="33462598" cy="11248995"/>
           </a:xfrm>
           <a:prstGeom prst="rect">
             <a:avLst/>
@@ -3664,10 +3664,10 @@
       </p:pic>
       <p:sp>
         <p:nvSpPr>
-          <p:cNvPr id="21" name="TextBox 20">
+          <p:cNvPr id="14" name="TextBox 13">
             <a:extLst>
               <a:ext uri="{FF2B5EF4-FFF2-40B4-BE49-F238E27FC236}">
-                <a16:creationId xmlns:a16="http://schemas.microsoft.com/office/drawing/2014/main" id="{2D4F9E01-A35B-1644-7819-90D979778EC3}"/>
+                <a16:creationId xmlns:a16="http://schemas.microsoft.com/office/drawing/2014/main" id="{BEB8B5F1-6D7C-F59B-F4BB-27A0C21B5FBF}"/>
               </a:ext>
             </a:extLst>
           </p:cNvPr>
@@ -3699,10 +3699,10 @@
       </p:sp>
       <p:sp>
         <p:nvSpPr>
-          <p:cNvPr id="22" name="TextBox 21">
+          <p:cNvPr id="16" name="TextBox 15">
             <a:extLst>
               <a:ext uri="{FF2B5EF4-FFF2-40B4-BE49-F238E27FC236}">
-                <a16:creationId xmlns:a16="http://schemas.microsoft.com/office/drawing/2014/main" id="{65C91CE2-64CD-802E-AC68-9A7F9229B7F7}"/>
+                <a16:creationId xmlns:a16="http://schemas.microsoft.com/office/drawing/2014/main" id="{D5D8C03E-994A-6B22-3F7B-E8416D452AD5}"/>
               </a:ext>
             </a:extLst>
           </p:cNvPr>
@@ -3734,10 +3734,10 @@
       </p:sp>
       <p:pic>
         <p:nvPicPr>
-          <p:cNvPr id="26" name="Picture 25" descr="A green line and orange line&#10;&#10;Description automatically generated with low confidence">
+          <p:cNvPr id="23" name="Picture 22" descr="A green line and orange line&#10;&#10;Description automatically generated with low confidence">
             <a:extLst>
               <a:ext uri="{FF2B5EF4-FFF2-40B4-BE49-F238E27FC236}">
-                <a16:creationId xmlns:a16="http://schemas.microsoft.com/office/drawing/2014/main" id="{CA930020-CFC5-849E-00BC-444D51ED0B4F}"/>
+                <a16:creationId xmlns:a16="http://schemas.microsoft.com/office/drawing/2014/main" id="{A3AAABB7-9E7B-C52B-C33C-0E3B432DC82D}"/>
               </a:ext>
             </a:extLst>
           </p:cNvPr>
@@ -3754,8 +3754,8 @@
         </p:blipFill>
         <p:spPr>
           <a:xfrm>
-            <a:off x="1229550" y="22639771"/>
-            <a:ext cx="35308349" cy="8827087"/>
+            <a:off x="1271114" y="22773415"/>
+            <a:ext cx="35308348" cy="8827087"/>
           </a:xfrm>
           <a:prstGeom prst="rect">
             <a:avLst/>
@@ -3764,10 +3764,10 @@
       </p:pic>
       <p:sp>
         <p:nvSpPr>
-          <p:cNvPr id="27" name="TextBox 26">
+          <p:cNvPr id="24" name="TextBox 23">
             <a:extLst>
               <a:ext uri="{FF2B5EF4-FFF2-40B4-BE49-F238E27FC236}">
-                <a16:creationId xmlns:a16="http://schemas.microsoft.com/office/drawing/2014/main" id="{C41E8F4E-1002-B4FB-0C13-0517786D9588}"/>
+                <a16:creationId xmlns:a16="http://schemas.microsoft.com/office/drawing/2014/main" id="{1FEE47BC-6E11-5D58-431C-9BA870A00BD8}"/>
               </a:ext>
             </a:extLst>
           </p:cNvPr>

</xml_diff>